<commit_message>
add currying example to power point
</commit_message>
<xml_diff>
--- a/Elm Lunch Talk.pptx
+++ b/Elm Lunch Talk.pptx
@@ -3942,7 +3942,7 @@
         <p:spPr/>
         <p:txBody>
           <a:bodyPr>
-            <a:normAutofit lnSpcReduction="10000"/>
+            <a:normAutofit fontScale="92500"/>
           </a:bodyPr>
           <a:lstStyle/>
           <a:p>
@@ -3991,13 +3991,7 @@
               <a:rPr lang="en-US" dirty="0">
                 <a:hlinkClick r:id="rId4"/>
               </a:rPr>
-              <a:t>https</a:t>
-            </a:r>
-            <a:r>
-              <a:rPr lang="en-US">
-                <a:hlinkClick r:id="rId4"/>
-              </a:rPr>
-              <a:t>://github.com/bernardwolff/elm-presentation/blob/master/immutability.elm</a:t>
+              <a:t>https://github.com/bernardwolff/elm-presentation/blob/master/immutability.elm</a:t>
             </a:r>
             <a:endParaRPr lang="en-US" dirty="0"/>
           </a:p>
@@ -4032,6 +4026,28 @@
               <a:rPr lang="en-US" dirty="0"/>
               <a:t> (MVU architecture, html created with functions, type annotations)</a:t>
             </a:r>
+          </a:p>
+          <a:p>
+            <a:r>
+              <a:rPr lang="en-US"/>
+              <a:t>Currying </a:t>
+            </a:r>
+            <a:r>
+              <a:rPr lang="en-US">
+                <a:hlinkClick r:id="rId7"/>
+              </a:rPr>
+              <a:t>https</a:t>
+            </a:r>
+            <a:r>
+              <a:rPr lang="en-US">
+                <a:hlinkClick r:id="rId7"/>
+              </a:rPr>
+              <a:t>://github.com/bernardwolff/elm-presentation/blob/master/currying.elm</a:t>
+            </a:r>
+            <a:endParaRPr lang="en-US"/>
+          </a:p>
+          <a:p>
+            <a:endParaRPr lang="en-US" dirty="0"/>
           </a:p>
           <a:p>
             <a:endParaRPr lang="en-US" dirty="0"/>

</xml_diff>